<commit_message>
Update PPT for 10 & 11
</commit_message>
<xml_diff>
--- a/Powerpoint/Introduction to Java Programming - Hour 10.pptx
+++ b/Powerpoint/Introduction to Java Programming - Hour 10.pptx
@@ -5,7 +5,7 @@
     <p:sldMasterId id="2147483816" r:id="rId1"/>
   </p:sldMasterIdLst>
   <p:handoutMasterIdLst>
-    <p:handoutMasterId r:id="rId17"/>
+    <p:handoutMasterId r:id="rId11"/>
   </p:handoutMasterIdLst>
   <p:sldIdLst>
     <p:sldId id="392" r:id="rId2"/>
@@ -17,12 +17,6 @@
     <p:sldId id="398" r:id="rId8"/>
     <p:sldId id="399" r:id="rId9"/>
     <p:sldId id="406" r:id="rId10"/>
-    <p:sldId id="400" r:id="rId11"/>
-    <p:sldId id="401" r:id="rId12"/>
-    <p:sldId id="402" r:id="rId13"/>
-    <p:sldId id="403" r:id="rId14"/>
-    <p:sldId id="404" r:id="rId15"/>
-    <p:sldId id="405" r:id="rId16"/>
   </p:sldIdLst>
   <p:sldSz cx="9144000" cy="6858000" type="screen4x3"/>
   <p:notesSz cx="7102475" cy="9388475"/>
@@ -222,7 +216,7 @@
           <a:p>
             <a:fld id="{B30A61B1-7DC2-4510-A16A-DCA60B4B994A}" type="datetimeFigureOut">
               <a:rPr lang="en-US" smtClean="0"/>
-              <a:t>7/22/2013</a:t>
+              <a:t>8/8/2013</a:t>
             </a:fld>
             <a:endParaRPr lang="en-US"/>
           </a:p>
@@ -448,7 +442,7 @@
           <a:p>
             <a:fld id="{3F57F615-55C3-4F4F-83D6-4B35940FA14F}" type="datetimeFigureOut">
               <a:rPr lang="en-US" smtClean="0"/>
-              <a:t>7/22/2013</a:t>
+              <a:t>8/8/2013</a:t>
             </a:fld>
             <a:endParaRPr lang="en-US"/>
           </a:p>
@@ -814,7 +808,7 @@
           <a:p>
             <a:fld id="{3F57F615-55C3-4F4F-83D6-4B35940FA14F}" type="datetimeFigureOut">
               <a:rPr lang="en-US" smtClean="0"/>
-              <a:t>7/22/2013</a:t>
+              <a:t>8/8/2013</a:t>
             </a:fld>
             <a:endParaRPr lang="en-US"/>
           </a:p>
@@ -996,7 +990,7 @@
           <a:p>
             <a:fld id="{3F57F615-55C3-4F4F-83D6-4B35940FA14F}" type="datetimeFigureOut">
               <a:rPr lang="en-US" smtClean="0"/>
-              <a:t>7/22/2013</a:t>
+              <a:t>8/8/2013</a:t>
             </a:fld>
             <a:endParaRPr lang="en-US"/>
           </a:p>
@@ -1238,7 +1232,7 @@
           <a:p>
             <a:fld id="{3F57F615-55C3-4F4F-83D6-4B35940FA14F}" type="datetimeFigureOut">
               <a:rPr lang="en-US" smtClean="0"/>
-              <a:t>7/22/2013</a:t>
+              <a:t>8/8/2013</a:t>
             </a:fld>
             <a:endParaRPr lang="en-US"/>
           </a:p>
@@ -1514,7 +1508,7 @@
           <a:p>
             <a:fld id="{3F57F615-55C3-4F4F-83D6-4B35940FA14F}" type="datetimeFigureOut">
               <a:rPr lang="en-US" smtClean="0"/>
-              <a:t>7/22/2013</a:t>
+              <a:t>8/8/2013</a:t>
             </a:fld>
             <a:endParaRPr lang="en-US"/>
           </a:p>
@@ -1741,7 +1735,7 @@
           <a:p>
             <a:fld id="{3F57F615-55C3-4F4F-83D6-4B35940FA14F}" type="datetimeFigureOut">
               <a:rPr lang="en-US" smtClean="0"/>
-              <a:t>7/22/2013</a:t>
+              <a:t>8/8/2013</a:t>
             </a:fld>
             <a:endParaRPr lang="en-US"/>
           </a:p>
@@ -2100,7 +2094,7 @@
           <a:p>
             <a:fld id="{3F57F615-55C3-4F4F-83D6-4B35940FA14F}" type="datetimeFigureOut">
               <a:rPr lang="en-US" smtClean="0"/>
-              <a:t>7/22/2013</a:t>
+              <a:t>8/8/2013</a:t>
             </a:fld>
             <a:endParaRPr lang="en-US"/>
           </a:p>
@@ -2339,7 +2333,7 @@
           <a:p>
             <a:fld id="{3F57F615-55C3-4F4F-83D6-4B35940FA14F}" type="datetimeFigureOut">
               <a:rPr lang="en-US" smtClean="0"/>
-              <a:t>7/22/2013</a:t>
+              <a:t>8/8/2013</a:t>
             </a:fld>
             <a:endParaRPr lang="en-US"/>
           </a:p>
@@ -2486,7 +2480,7 @@
           <a:p>
             <a:fld id="{3F57F615-55C3-4F4F-83D6-4B35940FA14F}" type="datetimeFigureOut">
               <a:rPr lang="en-US" smtClean="0"/>
-              <a:t>7/22/2013</a:t>
+              <a:t>8/8/2013</a:t>
             </a:fld>
             <a:endParaRPr lang="en-US"/>
           </a:p>
@@ -2770,7 +2764,7 @@
           <a:p>
             <a:fld id="{3F57F615-55C3-4F4F-83D6-4B35940FA14F}" type="datetimeFigureOut">
               <a:rPr lang="en-US" smtClean="0"/>
-              <a:t>7/22/2013</a:t>
+              <a:t>8/8/2013</a:t>
             </a:fld>
             <a:endParaRPr lang="en-US"/>
           </a:p>
@@ -3184,7 +3178,7 @@
           <a:p>
             <a:fld id="{3F57F615-55C3-4F4F-83D6-4B35940FA14F}" type="datetimeFigureOut">
               <a:rPr lang="en-US" smtClean="0"/>
-              <a:t>7/22/2013</a:t>
+              <a:t>8/8/2013</a:t>
             </a:fld>
             <a:endParaRPr lang="en-US"/>
           </a:p>
@@ -3529,7 +3523,7 @@
           <a:p>
             <a:fld id="{3F57F615-55C3-4F4F-83D6-4B35940FA14F}" type="datetimeFigureOut">
               <a:rPr lang="en-US" smtClean="0"/>
-              <a:t>7/22/2013</a:t>
+              <a:t>8/8/2013</a:t>
             </a:fld>
             <a:endParaRPr lang="en-US"/>
           </a:p>
@@ -4157,530 +4151,6 @@
     <p:extLst>
       <p:ext uri="{BB962C8B-B14F-4D97-AF65-F5344CB8AC3E}">
         <p14:creationId xmlns:p14="http://schemas.microsoft.com/office/powerpoint/2010/main" val="1701643202"/>
-      </p:ext>
-    </p:extLst>
-  </p:cSld>
-  <p:clrMapOvr>
-    <a:masterClrMapping/>
-  </p:clrMapOvr>
-  <p:timing>
-    <p:tnLst>
-      <p:par>
-        <p:cTn id="1" dur="indefinite" restart="never" nodeType="tmRoot"/>
-      </p:par>
-    </p:tnLst>
-  </p:timing>
-</p:sld>
-</file>
-
-<file path=ppt/slides/slide10.xml><?xml version="1.0" encoding="utf-8"?>
-<p:sld xmlns:a="http://schemas.openxmlformats.org/drawingml/2006/main" xmlns:r="http://schemas.openxmlformats.org/officeDocument/2006/relationships" xmlns:p="http://schemas.openxmlformats.org/presentationml/2006/main">
-  <p:cSld>
-    <p:spTree>
-      <p:nvGrpSpPr>
-        <p:cNvPr id="1" name=""/>
-        <p:cNvGrpSpPr/>
-        <p:nvPr/>
-      </p:nvGrpSpPr>
-      <p:grpSpPr>
-        <a:xfrm>
-          <a:off x="0" y="0"/>
-          <a:ext cx="0" cy="0"/>
-          <a:chOff x="0" y="0"/>
-          <a:chExt cx="0" cy="0"/>
-        </a:xfrm>
-      </p:grpSpPr>
-      <p:sp>
-        <p:nvSpPr>
-          <p:cNvPr id="2" name="Title 1"/>
-          <p:cNvSpPr>
-            <a:spLocks noGrp="1"/>
-          </p:cNvSpPr>
-          <p:nvPr>
-            <p:ph type="title"/>
-          </p:nvPr>
-        </p:nvSpPr>
-        <p:spPr/>
-        <p:txBody>
-          <a:bodyPr>
-            <a:normAutofit fontScale="90000"/>
-          </a:bodyPr>
-          <a:lstStyle/>
-          <a:p>
-            <a:r>
-              <a:rPr lang="en-US" dirty="0" smtClean="0"/>
-              <a:t>Converting Objects and Simple Variables</a:t>
-            </a:r>
-            <a:endParaRPr lang="en-US" dirty="0"/>
-          </a:p>
-        </p:txBody>
-      </p:sp>
-      <p:sp>
-        <p:nvSpPr>
-          <p:cNvPr id="3" name="Content Placeholder 2"/>
-          <p:cNvSpPr>
-            <a:spLocks noGrp="1"/>
-          </p:cNvSpPr>
-          <p:nvPr>
-            <p:ph sz="quarter" idx="1"/>
-          </p:nvPr>
-        </p:nvSpPr>
-        <p:spPr/>
-        <p:txBody>
-          <a:bodyPr/>
-          <a:lstStyle/>
-          <a:p>
-            <a:r>
-              <a:rPr lang="en-US" dirty="0" smtClean="0"/>
-              <a:t>Casting is used to convert from one type of data to another</a:t>
-            </a:r>
-          </a:p>
-          <a:p>
-            <a:r>
-              <a:rPr lang="en-US" dirty="0" smtClean="0"/>
-              <a:t>Casting Simple Variables</a:t>
-            </a:r>
-          </a:p>
-          <a:p>
-            <a:pPr lvl="1"/>
-            <a:endParaRPr lang="en-US" dirty="0"/>
-          </a:p>
-        </p:txBody>
-      </p:sp>
-    </p:spTree>
-    <p:extLst>
-      <p:ext uri="{BB962C8B-B14F-4D97-AF65-F5344CB8AC3E}">
-        <p14:creationId xmlns:p14="http://schemas.microsoft.com/office/powerpoint/2010/main" val="3935826649"/>
-      </p:ext>
-    </p:extLst>
-  </p:cSld>
-  <p:clrMapOvr>
-    <a:masterClrMapping/>
-  </p:clrMapOvr>
-  <p:timing>
-    <p:tnLst>
-      <p:par>
-        <p:cTn id="1" dur="indefinite" restart="never" nodeType="tmRoot"/>
-      </p:par>
-    </p:tnLst>
-  </p:timing>
-</p:sld>
-</file>
-
-<file path=ppt/slides/slide11.xml><?xml version="1.0" encoding="utf-8"?>
-<p:sld xmlns:a="http://schemas.openxmlformats.org/drawingml/2006/main" xmlns:r="http://schemas.openxmlformats.org/officeDocument/2006/relationships" xmlns:p="http://schemas.openxmlformats.org/presentationml/2006/main">
-  <p:cSld>
-    <p:spTree>
-      <p:nvGrpSpPr>
-        <p:cNvPr id="1" name=""/>
-        <p:cNvGrpSpPr/>
-        <p:nvPr/>
-      </p:nvGrpSpPr>
-      <p:grpSpPr>
-        <a:xfrm>
-          <a:off x="0" y="0"/>
-          <a:ext cx="0" cy="0"/>
-          <a:chOff x="0" y="0"/>
-          <a:chExt cx="0" cy="0"/>
-        </a:xfrm>
-      </p:grpSpPr>
-      <p:sp>
-        <p:nvSpPr>
-          <p:cNvPr id="2" name="Title 1"/>
-          <p:cNvSpPr>
-            <a:spLocks noGrp="1"/>
-          </p:cNvSpPr>
-          <p:nvPr>
-            <p:ph type="title"/>
-          </p:nvPr>
-        </p:nvSpPr>
-        <p:spPr/>
-        <p:txBody>
-          <a:bodyPr>
-            <a:normAutofit fontScale="90000"/>
-          </a:bodyPr>
-          <a:lstStyle/>
-          <a:p>
-            <a:r>
-              <a:rPr lang="en-US" dirty="0" smtClean="0"/>
-              <a:t>Converting Objects and Simple Variables</a:t>
-            </a:r>
-            <a:endParaRPr lang="en-US" dirty="0"/>
-          </a:p>
-        </p:txBody>
-      </p:sp>
-      <p:sp>
-        <p:nvSpPr>
-          <p:cNvPr id="3" name="Content Placeholder 2"/>
-          <p:cNvSpPr>
-            <a:spLocks noGrp="1"/>
-          </p:cNvSpPr>
-          <p:nvPr>
-            <p:ph sz="quarter" idx="1"/>
-          </p:nvPr>
-        </p:nvSpPr>
-        <p:spPr/>
-        <p:txBody>
-          <a:bodyPr/>
-          <a:lstStyle/>
-          <a:p>
-            <a:r>
-              <a:rPr lang="en-US" dirty="0" smtClean="0"/>
-              <a:t>Casting Objects</a:t>
-            </a:r>
-          </a:p>
-          <a:p>
-            <a:pPr lvl="1"/>
-            <a:endParaRPr lang="en-US" dirty="0"/>
-          </a:p>
-        </p:txBody>
-      </p:sp>
-    </p:spTree>
-    <p:extLst>
-      <p:ext uri="{BB962C8B-B14F-4D97-AF65-F5344CB8AC3E}">
-        <p14:creationId xmlns:p14="http://schemas.microsoft.com/office/powerpoint/2010/main" val="612658158"/>
-      </p:ext>
-    </p:extLst>
-  </p:cSld>
-  <p:clrMapOvr>
-    <a:masterClrMapping/>
-  </p:clrMapOvr>
-  <p:timing>
-    <p:tnLst>
-      <p:par>
-        <p:cTn id="1" dur="indefinite" restart="never" nodeType="tmRoot"/>
-      </p:par>
-    </p:tnLst>
-  </p:timing>
-</p:sld>
-</file>
-
-<file path=ppt/slides/slide12.xml><?xml version="1.0" encoding="utf-8"?>
-<p:sld xmlns:a="http://schemas.openxmlformats.org/drawingml/2006/main" xmlns:r="http://schemas.openxmlformats.org/officeDocument/2006/relationships" xmlns:p="http://schemas.openxmlformats.org/presentationml/2006/main">
-  <p:cSld>
-    <p:spTree>
-      <p:nvGrpSpPr>
-        <p:cNvPr id="1" name=""/>
-        <p:cNvGrpSpPr/>
-        <p:nvPr/>
-      </p:nvGrpSpPr>
-      <p:grpSpPr>
-        <a:xfrm>
-          <a:off x="0" y="0"/>
-          <a:ext cx="0" cy="0"/>
-          <a:chOff x="0" y="0"/>
-          <a:chExt cx="0" cy="0"/>
-        </a:xfrm>
-      </p:grpSpPr>
-      <p:sp>
-        <p:nvSpPr>
-          <p:cNvPr id="2" name="Title 1"/>
-          <p:cNvSpPr>
-            <a:spLocks noGrp="1"/>
-          </p:cNvSpPr>
-          <p:nvPr>
-            <p:ph type="title"/>
-          </p:nvPr>
-        </p:nvSpPr>
-        <p:spPr/>
-        <p:txBody>
-          <a:bodyPr>
-            <a:normAutofit fontScale="90000"/>
-          </a:bodyPr>
-          <a:lstStyle/>
-          <a:p>
-            <a:r>
-              <a:rPr lang="en-US" dirty="0" smtClean="0"/>
-              <a:t>Converting Objects and Simple Variables</a:t>
-            </a:r>
-            <a:endParaRPr lang="en-US" dirty="0"/>
-          </a:p>
-        </p:txBody>
-      </p:sp>
-      <p:sp>
-        <p:nvSpPr>
-          <p:cNvPr id="3" name="Content Placeholder 2"/>
-          <p:cNvSpPr>
-            <a:spLocks noGrp="1"/>
-          </p:cNvSpPr>
-          <p:nvPr>
-            <p:ph sz="quarter" idx="1"/>
-          </p:nvPr>
-        </p:nvSpPr>
-        <p:spPr/>
-        <p:txBody>
-          <a:bodyPr/>
-          <a:lstStyle/>
-          <a:p>
-            <a:r>
-              <a:rPr lang="en-US" dirty="0" smtClean="0"/>
-              <a:t>Converting Simple Variables to Objects and Back</a:t>
-            </a:r>
-          </a:p>
-          <a:p>
-            <a:pPr lvl="1"/>
-            <a:endParaRPr lang="en-US" dirty="0"/>
-          </a:p>
-        </p:txBody>
-      </p:sp>
-    </p:spTree>
-    <p:extLst>
-      <p:ext uri="{BB962C8B-B14F-4D97-AF65-F5344CB8AC3E}">
-        <p14:creationId xmlns:p14="http://schemas.microsoft.com/office/powerpoint/2010/main" val="2622287527"/>
-      </p:ext>
-    </p:extLst>
-  </p:cSld>
-  <p:clrMapOvr>
-    <a:masterClrMapping/>
-  </p:clrMapOvr>
-  <p:timing>
-    <p:tnLst>
-      <p:par>
-        <p:cTn id="1" dur="indefinite" restart="never" nodeType="tmRoot"/>
-      </p:par>
-    </p:tnLst>
-  </p:timing>
-</p:sld>
-</file>
-
-<file path=ppt/slides/slide13.xml><?xml version="1.0" encoding="utf-8"?>
-<p:sld xmlns:a="http://schemas.openxmlformats.org/drawingml/2006/main" xmlns:r="http://schemas.openxmlformats.org/officeDocument/2006/relationships" xmlns:p="http://schemas.openxmlformats.org/presentationml/2006/main">
-  <p:cSld>
-    <p:spTree>
-      <p:nvGrpSpPr>
-        <p:cNvPr id="1" name=""/>
-        <p:cNvGrpSpPr/>
-        <p:nvPr/>
-      </p:nvGrpSpPr>
-      <p:grpSpPr>
-        <a:xfrm>
-          <a:off x="0" y="0"/>
-          <a:ext cx="0" cy="0"/>
-          <a:chOff x="0" y="0"/>
-          <a:chExt cx="0" cy="0"/>
-        </a:xfrm>
-      </p:grpSpPr>
-      <p:sp>
-        <p:nvSpPr>
-          <p:cNvPr id="2" name="Title 1"/>
-          <p:cNvSpPr>
-            <a:spLocks noGrp="1"/>
-          </p:cNvSpPr>
-          <p:nvPr>
-            <p:ph type="title"/>
-          </p:nvPr>
-        </p:nvSpPr>
-        <p:spPr/>
-        <p:txBody>
-          <a:bodyPr>
-            <a:normAutofit fontScale="90000"/>
-          </a:bodyPr>
-          <a:lstStyle/>
-          <a:p>
-            <a:r>
-              <a:rPr lang="en-US" dirty="0" smtClean="0"/>
-              <a:t>Converting Objects and Simple Variables</a:t>
-            </a:r>
-            <a:endParaRPr lang="en-US" dirty="0"/>
-          </a:p>
-        </p:txBody>
-      </p:sp>
-      <p:sp>
-        <p:nvSpPr>
-          <p:cNvPr id="3" name="Content Placeholder 2"/>
-          <p:cNvSpPr>
-            <a:spLocks noGrp="1"/>
-          </p:cNvSpPr>
-          <p:nvPr>
-            <p:ph sz="quarter" idx="1"/>
-          </p:nvPr>
-        </p:nvSpPr>
-        <p:spPr/>
-        <p:txBody>
-          <a:bodyPr/>
-          <a:lstStyle/>
-          <a:p>
-            <a:r>
-              <a:rPr lang="en-US" dirty="0" err="1" smtClean="0"/>
-              <a:t>Autoboxing</a:t>
-            </a:r>
-            <a:r>
-              <a:rPr lang="en-US" dirty="0" smtClean="0"/>
-              <a:t> and Unboxing</a:t>
-            </a:r>
-          </a:p>
-          <a:p>
-            <a:pPr lvl="1"/>
-            <a:endParaRPr lang="en-US" dirty="0"/>
-          </a:p>
-        </p:txBody>
-      </p:sp>
-    </p:spTree>
-    <p:extLst>
-      <p:ext uri="{BB962C8B-B14F-4D97-AF65-F5344CB8AC3E}">
-        <p14:creationId xmlns:p14="http://schemas.microsoft.com/office/powerpoint/2010/main" val="991052250"/>
-      </p:ext>
-    </p:extLst>
-  </p:cSld>
-  <p:clrMapOvr>
-    <a:masterClrMapping/>
-  </p:clrMapOvr>
-  <p:timing>
-    <p:tnLst>
-      <p:par>
-        <p:cTn id="1" dur="indefinite" restart="never" nodeType="tmRoot"/>
-      </p:par>
-    </p:tnLst>
-  </p:timing>
-</p:sld>
-</file>
-
-<file path=ppt/slides/slide14.xml><?xml version="1.0" encoding="utf-8"?>
-<p:sld xmlns:a="http://schemas.openxmlformats.org/drawingml/2006/main" xmlns:r="http://schemas.openxmlformats.org/officeDocument/2006/relationships" xmlns:p="http://schemas.openxmlformats.org/presentationml/2006/main">
-  <p:cSld>
-    <p:spTree>
-      <p:nvGrpSpPr>
-        <p:cNvPr id="1" name=""/>
-        <p:cNvGrpSpPr/>
-        <p:nvPr/>
-      </p:nvGrpSpPr>
-      <p:grpSpPr>
-        <a:xfrm>
-          <a:off x="0" y="0"/>
-          <a:ext cx="0" cy="0"/>
-          <a:chOff x="0" y="0"/>
-          <a:chExt cx="0" cy="0"/>
-        </a:xfrm>
-      </p:grpSpPr>
-      <p:sp>
-        <p:nvSpPr>
-          <p:cNvPr id="2" name="Title 1"/>
-          <p:cNvSpPr>
-            <a:spLocks noGrp="1"/>
-          </p:cNvSpPr>
-          <p:nvPr>
-            <p:ph type="title"/>
-          </p:nvPr>
-        </p:nvSpPr>
-        <p:spPr/>
-        <p:txBody>
-          <a:bodyPr>
-            <a:normAutofit/>
-          </a:bodyPr>
-          <a:lstStyle/>
-          <a:p>
-            <a:r>
-              <a:rPr lang="en-US" dirty="0" smtClean="0"/>
-              <a:t>Creating an Object</a:t>
-            </a:r>
-            <a:endParaRPr lang="en-US" dirty="0"/>
-          </a:p>
-        </p:txBody>
-      </p:sp>
-      <p:sp>
-        <p:nvSpPr>
-          <p:cNvPr id="3" name="Content Placeholder 2"/>
-          <p:cNvSpPr>
-            <a:spLocks noGrp="1"/>
-          </p:cNvSpPr>
-          <p:nvPr>
-            <p:ph sz="quarter" idx="1"/>
-          </p:nvPr>
-        </p:nvSpPr>
-        <p:spPr/>
-        <p:txBody>
-          <a:bodyPr/>
-          <a:lstStyle/>
-          <a:p>
-            <a:endParaRPr lang="en-US" dirty="0"/>
-          </a:p>
-        </p:txBody>
-      </p:sp>
-    </p:spTree>
-    <p:extLst>
-      <p:ext uri="{BB962C8B-B14F-4D97-AF65-F5344CB8AC3E}">
-        <p14:creationId xmlns:p14="http://schemas.microsoft.com/office/powerpoint/2010/main" val="605218381"/>
-      </p:ext>
-    </p:extLst>
-  </p:cSld>
-  <p:clrMapOvr>
-    <a:masterClrMapping/>
-  </p:clrMapOvr>
-  <p:timing>
-    <p:tnLst>
-      <p:par>
-        <p:cTn id="1" dur="indefinite" restart="never" nodeType="tmRoot"/>
-      </p:par>
-    </p:tnLst>
-  </p:timing>
-</p:sld>
-</file>
-
-<file path=ppt/slides/slide15.xml><?xml version="1.0" encoding="utf-8"?>
-<p:sld xmlns:a="http://schemas.openxmlformats.org/drawingml/2006/main" xmlns:r="http://schemas.openxmlformats.org/officeDocument/2006/relationships" xmlns:p="http://schemas.openxmlformats.org/presentationml/2006/main">
-  <p:cSld>
-    <p:spTree>
-      <p:nvGrpSpPr>
-        <p:cNvPr id="1" name=""/>
-        <p:cNvGrpSpPr/>
-        <p:nvPr/>
-      </p:nvGrpSpPr>
-      <p:grpSpPr>
-        <a:xfrm>
-          <a:off x="0" y="0"/>
-          <a:ext cx="0" cy="0"/>
-          <a:chOff x="0" y="0"/>
-          <a:chExt cx="0" cy="0"/>
-        </a:xfrm>
-      </p:grpSpPr>
-      <p:sp>
-        <p:nvSpPr>
-          <p:cNvPr id="2" name="Title 1"/>
-          <p:cNvSpPr>
-            <a:spLocks noGrp="1"/>
-          </p:cNvSpPr>
-          <p:nvPr>
-            <p:ph type="title"/>
-          </p:nvPr>
-        </p:nvSpPr>
-        <p:spPr/>
-        <p:txBody>
-          <a:bodyPr>
-            <a:normAutofit/>
-          </a:bodyPr>
-          <a:lstStyle/>
-          <a:p>
-            <a:r>
-              <a:rPr lang="en-US" dirty="0" smtClean="0"/>
-              <a:t>Summary</a:t>
-            </a:r>
-            <a:endParaRPr lang="en-US" dirty="0"/>
-          </a:p>
-        </p:txBody>
-      </p:sp>
-      <p:sp>
-        <p:nvSpPr>
-          <p:cNvPr id="3" name="Content Placeholder 2"/>
-          <p:cNvSpPr>
-            <a:spLocks noGrp="1"/>
-          </p:cNvSpPr>
-          <p:nvPr>
-            <p:ph sz="quarter" idx="1"/>
-          </p:nvPr>
-        </p:nvSpPr>
-        <p:spPr/>
-        <p:txBody>
-          <a:bodyPr/>
-          <a:lstStyle/>
-          <a:p>
-            <a:endParaRPr lang="en-US" dirty="0"/>
-          </a:p>
-        </p:txBody>
-      </p:sp>
-    </p:spTree>
-    <p:extLst>
-      <p:ext uri="{BB962C8B-B14F-4D97-AF65-F5344CB8AC3E}">
-        <p14:creationId xmlns:p14="http://schemas.microsoft.com/office/powerpoint/2010/main" val="1171137027"/>
       </p:ext>
     </p:extLst>
   </p:cSld>

</xml_diff>